<commit_message>
Report + powerpoint + logo update
</commit_message>
<xml_diff>
--- a/meta/apps4x.pptx
+++ b/meta/apps4x.pptx
@@ -217,7 +217,7 @@
           <a:p>
             <a:fld id="{C93B6F63-3C83-4B8B-8FC8-E0181DBFF954}" type="datetimeFigureOut">
               <a:rPr lang="nl-BE" smtClean="0"/>
-              <a:t>17/07/2013</a:t>
+              <a:t>18/07/2013</a:t>
             </a:fld>
             <a:endParaRPr lang="nl-BE"/>
           </a:p>
@@ -977,7 +977,7 @@
           <a:p>
             <a:fld id="{896922FB-4B92-4F46-9186-B8E4ED77EF8D}" type="datetime1">
               <a:rPr lang="nl-BE" smtClean="0"/>
-              <a:t>17/07/2013</a:t>
+              <a:t>18/07/2013</a:t>
             </a:fld>
             <a:endParaRPr lang="nl-BE"/>
           </a:p>
@@ -1164,7 +1164,7 @@
           <a:p>
             <a:fld id="{1D6CE222-88FA-4BF1-8649-A4AC5BD82470}" type="datetime1">
               <a:rPr lang="nl-BE" smtClean="0"/>
-              <a:t>17/07/2013</a:t>
+              <a:t>18/07/2013</a:t>
             </a:fld>
             <a:endParaRPr lang="nl-BE"/>
           </a:p>
@@ -1359,7 +1359,7 @@
           <a:p>
             <a:fld id="{86173824-9B8C-4ACC-9D21-FD64430B78EF}" type="datetime1">
               <a:rPr lang="nl-BE" smtClean="0"/>
-              <a:t>17/07/2013</a:t>
+              <a:t>18/07/2013</a:t>
             </a:fld>
             <a:endParaRPr lang="nl-BE"/>
           </a:p>
@@ -1640,7 +1640,7 @@
           <a:p>
             <a:fld id="{9BDC82E7-3AA8-40AA-B912-0E30FBAB2BBA}" type="datetime1">
               <a:rPr lang="nl-BE" smtClean="0"/>
-              <a:t>17/07/2013</a:t>
+              <a:t>18/07/2013</a:t>
             </a:fld>
             <a:endParaRPr lang="nl-BE"/>
           </a:p>
@@ -2007,7 +2007,7 @@
           <a:p>
             <a:fld id="{79C52DF9-8208-40DE-B9F8-C883938860A1}" type="datetime1">
               <a:rPr lang="nl-BE" smtClean="0"/>
-              <a:t>17/07/2013</a:t>
+              <a:t>18/07/2013</a:t>
             </a:fld>
             <a:endParaRPr lang="nl-BE"/>
           </a:p>
@@ -2327,7 +2327,7 @@
           <a:p>
             <a:fld id="{F7E13451-9995-430E-ADE6-A2C97CD3A8FF}" type="datetime1">
               <a:rPr lang="nl-BE" smtClean="0"/>
-              <a:t>17/07/2013</a:t>
+              <a:t>18/07/2013</a:t>
             </a:fld>
             <a:endParaRPr lang="nl-BE"/>
           </a:p>
@@ -2566,7 +2566,7 @@
           <a:p>
             <a:fld id="{6C3845E8-6810-4B48-A1B1-CFE67FB457A8}" type="datetime1">
               <a:rPr lang="nl-BE" smtClean="0"/>
-              <a:t>17/07/2013</a:t>
+              <a:t>18/07/2013</a:t>
             </a:fld>
             <a:endParaRPr lang="nl-BE"/>
           </a:p>
@@ -2668,7 +2668,7 @@
           <a:p>
             <a:fld id="{86C93A69-B52C-4CF9-B6F1-98D723DAF45F}" type="datetime1">
               <a:rPr lang="nl-BE" smtClean="0"/>
-              <a:t>17/07/2013</a:t>
+              <a:t>18/07/2013</a:t>
             </a:fld>
             <a:endParaRPr lang="nl-BE"/>
           </a:p>
@@ -2968,7 +2968,7 @@
           <a:p>
             <a:fld id="{7AEA33ED-A334-4993-A736-92BF9675871E}" type="datetime1">
               <a:rPr lang="nl-BE" smtClean="0"/>
-              <a:t>17/07/2013</a:t>
+              <a:t>18/07/2013</a:t>
             </a:fld>
             <a:endParaRPr lang="nl-BE"/>
           </a:p>
@@ -3249,7 +3249,7 @@
           <a:p>
             <a:fld id="{0E4CE69F-B4A1-4372-B693-F3079100DF7C}" type="datetime1">
               <a:rPr lang="nl-BE" smtClean="0"/>
-              <a:t>17/07/2013</a:t>
+              <a:t>18/07/2013</a:t>
             </a:fld>
             <a:endParaRPr lang="nl-BE"/>
           </a:p>
@@ -3471,7 +3471,7 @@
           <a:p>
             <a:fld id="{01286ED4-9D00-44D3-B579-CD260E63FCF5}" type="datetime1">
               <a:rPr lang="nl-BE" smtClean="0"/>
-              <a:t>17/07/2013</a:t>
+              <a:t>18/07/2013</a:t>
             </a:fld>
             <a:endParaRPr lang="nl-BE"/>
           </a:p>
@@ -4028,15 +4028,6 @@
         <p:blipFill>
           <a:blip r:embed="rId2">
             <a:extLst>
-              <a:ext uri="{BEBA8EAE-BF5A-486C-A8C5-ECC9F3942E4B}">
-                <a14:imgProps xmlns:a14="http://schemas.microsoft.com/office/drawing/2010/main">
-                  <a14:imgLayer r:embed="rId3">
-                    <a14:imgEffect>
-                      <a14:saturation sat="0"/>
-                    </a14:imgEffect>
-                  </a14:imgLayer>
-                </a14:imgProps>
-              </a:ext>
               <a:ext uri="{28A0092B-C50C-407E-A947-70E740481C1C}">
                 <a14:useLocalDpi xmlns:a14="http://schemas.microsoft.com/office/drawing/2010/main" val="0"/>
               </a:ext>
@@ -4047,64 +4038,13 @@
           </a:stretch>
         </p:blipFill>
         <p:spPr>
-          <a:xfrm rot="918597">
-            <a:off x="3739320" y="2132290"/>
+          <a:xfrm rot="331333">
+            <a:off x="3696163" y="2167048"/>
             <a:ext cx="2039745" cy="2039745"/>
           </a:xfrm>
           <a:prstGeom prst="rect">
             <a:avLst/>
           </a:prstGeom>
-        </p:spPr>
-      </p:pic>
-      <p:pic>
-        <p:nvPicPr>
-          <p:cNvPr id="1026" name="Picture 2" descr="https://si0.twimg.com/profile_images/3723060357/9ab4e12f513849896d82c692c9a0ea2e.png"/>
-          <p:cNvPicPr>
-            <a:picLocks noChangeAspect="1" noChangeArrowheads="1"/>
-          </p:cNvPicPr>
-          <p:nvPr/>
-        </p:nvPicPr>
-        <p:blipFill>
-          <a:blip r:embed="rId4" cstate="print">
-            <a:clrChange>
-              <a:clrFrom>
-                <a:srgbClr val="FFFFFF"/>
-              </a:clrFrom>
-              <a:clrTo>
-                <a:srgbClr val="FFFFFF">
-                  <a:alpha val="0"/>
-                </a:srgbClr>
-              </a:clrTo>
-            </a:clrChange>
-            <a:extLst>
-              <a:ext uri="{28A0092B-C50C-407E-A947-70E740481C1C}">
-                <a14:useLocalDpi xmlns:a14="http://schemas.microsoft.com/office/drawing/2010/main" val="0"/>
-              </a:ext>
-            </a:extLst>
-          </a:blip>
-          <a:srcRect/>
-          <a:stretch>
-            <a:fillRect/>
-          </a:stretch>
-        </p:blipFill>
-        <p:spPr bwMode="auto">
-          <a:xfrm rot="19066477">
-            <a:off x="4092646" y="3489368"/>
-            <a:ext cx="573924" cy="573924"/>
-          </a:xfrm>
-          <a:prstGeom prst="rect">
-            <a:avLst/>
-          </a:prstGeom>
-          <a:noFill/>
-          <a:extLst>
-            <a:ext uri="{909E8E84-426E-40DD-AFC4-6F175D3DCCD1}">
-              <a14:hiddenFill xmlns:a14="http://schemas.microsoft.com/office/drawing/2010/main">
-                <a:solidFill>
-                  <a:srgbClr val="FFFFFF"/>
-                </a:solidFill>
-              </a14:hiddenFill>
-            </a:ext>
-          </a:extLst>
         </p:spPr>
       </p:pic>
       <p:sp>
@@ -4115,7 +4055,7 @@
         </p:nvSpPr>
         <p:spPr>
           <a:xfrm>
-            <a:off x="3261405" y="4493998"/>
+            <a:off x="3383868" y="4442293"/>
             <a:ext cx="2376264" cy="646331"/>
           </a:xfrm>
           <a:prstGeom prst="rect">
@@ -4134,17 +4074,12 @@
               <a:rPr lang="nl-BE" dirty="0" smtClean="0"/>
               <a:t>@Apps4EU</a:t>
             </a:r>
-            <a:endParaRPr lang="nl-BE" dirty="0" smtClean="0"/>
           </a:p>
           <a:p>
             <a:pPr algn="ctr"/>
             <a:r>
               <a:rPr lang="nl-BE" dirty="0" smtClean="0"/>
-              <a:t>#</a:t>
-            </a:r>
-            <a:r>
-              <a:rPr lang="nl-BE" dirty="0" smtClean="0"/>
-              <a:t>oSoc13</a:t>
+              <a:t>#oSoc13</a:t>
             </a:r>
           </a:p>
         </p:txBody>
@@ -4232,7 +4167,7 @@
           <p:nvPr/>
         </p:nvPicPr>
         <p:blipFill>
-          <a:blip r:embed="rId5" cstate="print">
+          <a:blip r:embed="rId3" cstate="print">
             <a:extLst>
               <a:ext uri="{28A0092B-C50C-407E-A947-70E740481C1C}">
                 <a14:useLocalDpi xmlns:a14="http://schemas.microsoft.com/office/drawing/2010/main" val="0"/>
@@ -4343,7 +4278,7 @@
           <p:nvPr/>
         </p:nvPicPr>
         <p:blipFill>
-          <a:blip r:embed="rId6"/>
+          <a:blip r:embed="rId4"/>
           <a:stretch>
             <a:fillRect/>
           </a:stretch>
@@ -4374,7 +4309,7 @@
           <p:nvPr/>
         </p:nvPicPr>
         <p:blipFill>
-          <a:blip r:embed="rId7"/>
+          <a:blip r:embed="rId5"/>
           <a:stretch>
             <a:fillRect/>
           </a:stretch>
@@ -4398,7 +4333,7 @@
           <p:nvPr/>
         </p:nvPicPr>
         <p:blipFill>
-          <a:blip r:embed="rId8"/>
+          <a:blip r:embed="rId6"/>
           <a:stretch>
             <a:fillRect/>
           </a:stretch>
@@ -4675,7 +4610,6 @@
               <a:rPr lang="nl-BE" sz="2400" dirty="0"/>
               <a:t>@pietercolpaert</a:t>
             </a:r>
-            <a:endParaRPr lang="nl-BE" sz="2400" dirty="0"/>
           </a:p>
         </p:txBody>
       </p:sp>
@@ -4855,13 +4789,13 @@
   <p:clrMapOvr>
     <a:masterClrMapping/>
   </p:clrMapOvr>
-  <mc:AlternateContent xmlns:mc="http://schemas.openxmlformats.org/markup-compatibility/2006">
-    <mc:Choice xmlns:p14="http://schemas.microsoft.com/office/powerpoint/2010/main" Requires="p14">
+  <mc:AlternateContent xmlns:mc="http://schemas.openxmlformats.org/markup-compatibility/2006" xmlns:p14="http://schemas.microsoft.com/office/powerpoint/2010/main">
+    <mc:Choice Requires="p14">
       <p:transition spd="slow" p14:dur="800">
         <p14:flythrough/>
       </p:transition>
     </mc:Choice>
-    <mc:Fallback>
+    <mc:Fallback xmlns="">
       <p:transition spd="slow">
         <p:fade/>
       </p:transition>
@@ -6707,13 +6641,13 @@
   <p:clrMapOvr>
     <a:masterClrMapping/>
   </p:clrMapOvr>
-  <mc:AlternateContent xmlns:mc="http://schemas.openxmlformats.org/markup-compatibility/2006">
-    <mc:Choice xmlns:p14="http://schemas.microsoft.com/office/powerpoint/2010/main" Requires="p14">
+  <mc:AlternateContent xmlns:mc="http://schemas.openxmlformats.org/markup-compatibility/2006" xmlns:p14="http://schemas.microsoft.com/office/powerpoint/2010/main">
+    <mc:Choice Requires="p14">
       <p:transition spd="slow" p14:dur="800">
         <p14:flythrough/>
       </p:transition>
     </mc:Choice>
-    <mc:Fallback>
+    <mc:Fallback xmlns="">
       <p:transition spd="slow">
         <p:fade/>
       </p:transition>
@@ -8749,11 +8683,11 @@
   <p:clrMapOvr>
     <a:masterClrMapping/>
   </p:clrMapOvr>
-  <mc:AlternateContent xmlns:mc="http://schemas.openxmlformats.org/markup-compatibility/2006">
-    <mc:Choice xmlns:p14="http://schemas.microsoft.com/office/powerpoint/2010/main" Requires="p14">
+  <mc:AlternateContent xmlns:mc="http://schemas.openxmlformats.org/markup-compatibility/2006" xmlns:p14="http://schemas.microsoft.com/office/powerpoint/2010/main">
+    <mc:Choice Requires="p14">
       <p:transition p14:dur="0"/>
     </mc:Choice>
-    <mc:Fallback>
+    <mc:Fallback xmlns="">
       <p:transition/>
     </mc:Fallback>
   </mc:AlternateContent>
@@ -9530,11 +9464,11 @@
   <p:clrMapOvr>
     <a:masterClrMapping/>
   </p:clrMapOvr>
-  <mc:AlternateContent xmlns:mc="http://schemas.openxmlformats.org/markup-compatibility/2006">
-    <mc:Choice xmlns:p14="http://schemas.microsoft.com/office/powerpoint/2010/main" Requires="p14">
+  <mc:AlternateContent xmlns:mc="http://schemas.openxmlformats.org/markup-compatibility/2006" xmlns:p14="http://schemas.microsoft.com/office/powerpoint/2010/main">
+    <mc:Choice Requires="p14">
       <p:transition p14:dur="0"/>
     </mc:Choice>
-    <mc:Fallback>
+    <mc:Fallback xmlns="">
       <p:transition/>
     </mc:Fallback>
   </mc:AlternateContent>
@@ -10111,11 +10045,7 @@
           <a:p>
             <a:r>
               <a:rPr lang="nl-BE" dirty="0" smtClean="0"/>
-              <a:t>Organizers can </a:t>
-            </a:r>
-            <a:r>
-              <a:rPr lang="nl-BE" dirty="0" smtClean="0"/>
-              <a:t>manage their events</a:t>
+              <a:t>Organizers can manage their events</a:t>
             </a:r>
           </a:p>
           <a:p>
@@ -10146,11 +10076,7 @@
             </a:pPr>
             <a:r>
               <a:rPr lang="nl-BE" dirty="0" smtClean="0"/>
-              <a:t>People can submit Ideas and </a:t>
-            </a:r>
-            <a:r>
-              <a:rPr lang="nl-BE" dirty="0" smtClean="0"/>
-              <a:t>Apps</a:t>
+              <a:t>People can submit Ideas and Apps</a:t>
             </a:r>
           </a:p>
           <a:p>
@@ -10852,13 +10778,13 @@
   <p:clrMapOvr>
     <a:masterClrMapping/>
   </p:clrMapOvr>
-  <mc:AlternateContent xmlns:mc="http://schemas.openxmlformats.org/markup-compatibility/2006">
-    <mc:Choice xmlns:p14="http://schemas.microsoft.com/office/powerpoint/2010/main" Requires="p14">
+  <mc:AlternateContent xmlns:mc="http://schemas.openxmlformats.org/markup-compatibility/2006" xmlns:p14="http://schemas.microsoft.com/office/powerpoint/2010/main">
+    <mc:Choice Requires="p14">
       <p:transition spd="slow" p14:dur="800">
         <p14:flythrough/>
       </p:transition>
     </mc:Choice>
-    <mc:Fallback>
+    <mc:Fallback xmlns="">
       <p:transition spd="slow">
         <p:fade/>
       </p:transition>
@@ -11594,11 +11520,7 @@
           <a:p>
             <a:r>
               <a:rPr lang="nl-BE" dirty="0" smtClean="0"/>
-              <a:t>Data becomes structured</a:t>
-            </a:r>
-            <a:r>
-              <a:rPr lang="nl-BE" dirty="0" smtClean="0"/>
-              <a:t> </a:t>
+              <a:t>Data becomes structured </a:t>
             </a:r>
           </a:p>
           <a:p>

</xml_diff>

<commit_message>
Page tpl for ideas Promo files
</commit_message>
<xml_diff>
--- a/meta/apps4x.pptx
+++ b/meta/apps4x.pptx
@@ -217,7 +217,7 @@
           <a:p>
             <a:fld id="{C93B6F63-3C83-4B8B-8FC8-E0181DBFF954}" type="datetimeFigureOut">
               <a:rPr lang="nl-BE" smtClean="0"/>
-              <a:t>18/07/2013</a:t>
+              <a:t>19/07/2013</a:t>
             </a:fld>
             <a:endParaRPr lang="nl-BE"/>
           </a:p>
@@ -648,7 +648,7 @@
           </a:lstStyle>
           <a:p>
             <a:r>
-              <a:rPr lang="en-US" smtClean="0"/>
+              <a:rPr lang="en-US" dirty="0" smtClean="0"/>
               <a:t>Click to edit Master title style</a:t>
             </a:r>
             <a:endParaRPr lang="en-US" dirty="0"/>
@@ -793,7 +793,7 @@
           <a:p>
             <a:fld id="{01286ED4-9D00-44D3-B579-CD260E63FCF5}" type="datetime1">
               <a:rPr lang="nl-BE" smtClean="0"/>
-              <a:t>18/07/2013</a:t>
+              <a:t>19/07/2013</a:t>
             </a:fld>
             <a:endParaRPr lang="nl-BE"/>
           </a:p>
@@ -977,7 +977,7 @@
           <a:p>
             <a:fld id="{896922FB-4B92-4F46-9186-B8E4ED77EF8D}" type="datetime1">
               <a:rPr lang="nl-BE" smtClean="0"/>
-              <a:t>18/07/2013</a:t>
+              <a:t>19/07/2013</a:t>
             </a:fld>
             <a:endParaRPr lang="nl-BE"/>
           </a:p>
@@ -1164,7 +1164,7 @@
           <a:p>
             <a:fld id="{1D6CE222-88FA-4BF1-8649-A4AC5BD82470}" type="datetime1">
               <a:rPr lang="nl-BE" smtClean="0"/>
-              <a:t>18/07/2013</a:t>
+              <a:t>19/07/2013</a:t>
             </a:fld>
             <a:endParaRPr lang="nl-BE"/>
           </a:p>
@@ -1262,10 +1262,16 @@
         <p:spPr/>
         <p:txBody>
           <a:bodyPr/>
-          <a:lstStyle/>
-          <a:p>
-            <a:r>
-              <a:rPr lang="en-US" smtClean="0"/>
+          <a:lstStyle>
+            <a:lvl1pPr>
+              <a:defRPr>
+                <a:effectLst/>
+              </a:defRPr>
+            </a:lvl1pPr>
+          </a:lstStyle>
+          <a:p>
+            <a:r>
+              <a:rPr lang="en-US" dirty="0" smtClean="0"/>
               <a:t>Click to edit Master title style</a:t>
             </a:r>
             <a:endParaRPr lang="en-US" dirty="0"/>
@@ -1359,7 +1365,7 @@
           <a:p>
             <a:fld id="{86173824-9B8C-4ACC-9D21-FD64430B78EF}" type="datetime1">
               <a:rPr lang="nl-BE" smtClean="0"/>
-              <a:t>18/07/2013</a:t>
+              <a:t>19/07/2013</a:t>
             </a:fld>
             <a:endParaRPr lang="nl-BE"/>
           </a:p>
@@ -1640,7 +1646,7 @@
           <a:p>
             <a:fld id="{9BDC82E7-3AA8-40AA-B912-0E30FBAB2BBA}" type="datetime1">
               <a:rPr lang="nl-BE" smtClean="0"/>
-              <a:t>18/07/2013</a:t>
+              <a:t>19/07/2013</a:t>
             </a:fld>
             <a:endParaRPr lang="nl-BE"/>
           </a:p>
@@ -2007,7 +2013,7 @@
           <a:p>
             <a:fld id="{79C52DF9-8208-40DE-B9F8-C883938860A1}" type="datetime1">
               <a:rPr lang="nl-BE" smtClean="0"/>
-              <a:t>18/07/2013</a:t>
+              <a:t>19/07/2013</a:t>
             </a:fld>
             <a:endParaRPr lang="nl-BE"/>
           </a:p>
@@ -2327,7 +2333,7 @@
           <a:p>
             <a:fld id="{F7E13451-9995-430E-ADE6-A2C97CD3A8FF}" type="datetime1">
               <a:rPr lang="nl-BE" smtClean="0"/>
-              <a:t>18/07/2013</a:t>
+              <a:t>19/07/2013</a:t>
             </a:fld>
             <a:endParaRPr lang="nl-BE"/>
           </a:p>
@@ -2566,7 +2572,7 @@
           <a:p>
             <a:fld id="{6C3845E8-6810-4B48-A1B1-CFE67FB457A8}" type="datetime1">
               <a:rPr lang="nl-BE" smtClean="0"/>
-              <a:t>18/07/2013</a:t>
+              <a:t>19/07/2013</a:t>
             </a:fld>
             <a:endParaRPr lang="nl-BE"/>
           </a:p>
@@ -2668,7 +2674,7 @@
           <a:p>
             <a:fld id="{86C93A69-B52C-4CF9-B6F1-98D723DAF45F}" type="datetime1">
               <a:rPr lang="nl-BE" smtClean="0"/>
-              <a:t>18/07/2013</a:t>
+              <a:t>19/07/2013</a:t>
             </a:fld>
             <a:endParaRPr lang="nl-BE"/>
           </a:p>
@@ -2968,7 +2974,7 @@
           <a:p>
             <a:fld id="{7AEA33ED-A334-4993-A736-92BF9675871E}" type="datetime1">
               <a:rPr lang="nl-BE" smtClean="0"/>
-              <a:t>18/07/2013</a:t>
+              <a:t>19/07/2013</a:t>
             </a:fld>
             <a:endParaRPr lang="nl-BE"/>
           </a:p>
@@ -3249,7 +3255,7 @@
           <a:p>
             <a:fld id="{0E4CE69F-B4A1-4372-B693-F3079100DF7C}" type="datetime1">
               <a:rPr lang="nl-BE" smtClean="0"/>
-              <a:t>18/07/2013</a:t>
+              <a:t>19/07/2013</a:t>
             </a:fld>
             <a:endParaRPr lang="nl-BE"/>
           </a:p>
@@ -3471,7 +3477,7 @@
           <a:p>
             <a:fld id="{01286ED4-9D00-44D3-B579-CD260E63FCF5}" type="datetime1">
               <a:rPr lang="nl-BE" smtClean="0"/>
-              <a:t>18/07/2013</a:t>
+              <a:t>19/07/2013</a:t>
             </a:fld>
             <a:endParaRPr lang="nl-BE"/>
           </a:p>
@@ -3982,10 +3988,14 @@
           <a:lstStyle/>
           <a:p>
             <a:r>
-              <a:rPr lang="nl-BE" sz="5400" dirty="0" smtClean="0"/>
+              <a:rPr lang="nl-BE" sz="5400" dirty="0" smtClean="0">
+                <a:effectLst/>
+              </a:rPr>
               <a:t>Apps4X WordPress plugin</a:t>
             </a:r>
-            <a:endParaRPr lang="nl-BE" sz="5400" dirty="0"/>
+            <a:endParaRPr lang="nl-BE" sz="5400" dirty="0">
+              <a:effectLst/>
+            </a:endParaRPr>
           </a:p>
         </p:txBody>
       </p:sp>
@@ -5533,50 +5543,6 @@
           </p:txBody>
         </p:sp>
       </p:grpSp>
-      <p:sp>
-        <p:nvSpPr>
-          <p:cNvPr id="8" name="Rectangle 7"/>
-          <p:cNvSpPr/>
-          <p:nvPr/>
-        </p:nvSpPr>
-        <p:spPr>
-          <a:xfrm>
-            <a:off x="1134579" y="1916832"/>
-            <a:ext cx="1747081" cy="923330"/>
-          </a:xfrm>
-          <a:prstGeom prst="rect">
-            <a:avLst/>
-          </a:prstGeom>
-          <a:noFill/>
-        </p:spPr>
-        <p:txBody>
-          <a:bodyPr wrap="none" lIns="91440" tIns="45720" rIns="91440" bIns="45720">
-            <a:prstTxWarp prst="textArchUp">
-              <a:avLst/>
-            </a:prstTxWarp>
-            <a:spAutoFit/>
-          </a:bodyPr>
-          <a:lstStyle/>
-          <a:p>
-            <a:pPr algn="ctr"/>
-            <a:r>
-              <a:rPr lang="en-US" sz="2400" b="0" cap="none" spc="0" dirty="0" smtClean="0">
-                <a:ln w="0"/>
-                <a:solidFill>
-                  <a:schemeClr val="accent5"/>
-                </a:solidFill>
-              </a:rPr>
-              <a:t>Event</a:t>
-            </a:r>
-            <a:endParaRPr lang="en-US" sz="2400" b="0" cap="none" spc="0" dirty="0">
-              <a:ln w="0"/>
-              <a:solidFill>
-                <a:schemeClr val="accent5"/>
-              </a:solidFill>
-            </a:endParaRPr>
-          </a:p>
-        </p:txBody>
-      </p:sp>
       <p:grpSp>
         <p:nvGrpSpPr>
           <p:cNvPr id="50" name="Group 49"/>
@@ -6631,6 +6597,53 @@
           </p:spPr>
         </p:pic>
       </p:grpSp>
+      <p:sp>
+        <p:nvSpPr>
+          <p:cNvPr id="48" name="Rectangle 47"/>
+          <p:cNvSpPr/>
+          <p:nvPr/>
+        </p:nvSpPr>
+        <p:spPr>
+          <a:xfrm>
+            <a:off x="1134579" y="2217638"/>
+            <a:ext cx="1747081" cy="923330"/>
+          </a:xfrm>
+          <a:prstGeom prst="rect">
+            <a:avLst/>
+          </a:prstGeom>
+          <a:noFill/>
+        </p:spPr>
+        <p:txBody>
+          <a:bodyPr wrap="none" lIns="91440" tIns="45720" rIns="91440" bIns="45720">
+            <a:prstTxWarp prst="textArchUp">
+              <a:avLst/>
+            </a:prstTxWarp>
+            <a:spAutoFit/>
+          </a:bodyPr>
+          <a:lstStyle/>
+          <a:p>
+            <a:pPr algn="ctr"/>
+            <a:r>
+              <a:rPr lang="en-US" sz="2400" dirty="0">
+                <a:ln w="0"/>
+                <a:solidFill>
+                  <a:schemeClr val="accent5"/>
+                </a:solidFill>
+              </a:rPr>
+              <a:t>Co-creation Event</a:t>
+            </a:r>
+          </a:p>
+          <a:p>
+            <a:pPr algn="ctr"/>
+            <a:endParaRPr lang="en-US" sz="2400" b="0" cap="none" spc="0" dirty="0">
+              <a:ln w="0"/>
+              <a:solidFill>
+                <a:schemeClr val="accent5"/>
+              </a:solidFill>
+            </a:endParaRPr>
+          </a:p>
+        </p:txBody>
+      </p:sp>
     </p:spTree>
     <p:extLst>
       <p:ext uri="{BB962C8B-B14F-4D97-AF65-F5344CB8AC3E}">
@@ -7217,7 +7230,7 @@
         </p:nvSpPr>
         <p:spPr>
           <a:xfrm>
-            <a:off x="1134579" y="1916832"/>
+            <a:off x="1134579" y="2217638"/>
             <a:ext cx="1747081" cy="923330"/>
           </a:xfrm>
           <a:prstGeom prst="rect">
@@ -7236,14 +7249,17 @@
           <a:p>
             <a:pPr algn="ctr"/>
             <a:r>
-              <a:rPr lang="en-US" sz="2400" b="0" cap="none" spc="0" dirty="0" smtClean="0">
+              <a:rPr lang="en-US" sz="2400" dirty="0">
                 <a:ln w="0"/>
                 <a:solidFill>
                   <a:schemeClr val="accent5"/>
                 </a:solidFill>
               </a:rPr>
-              <a:t>Event</a:t>
-            </a:r>
+              <a:t>Co-creation Event</a:t>
+            </a:r>
+          </a:p>
+          <a:p>
+            <a:pPr algn="ctr"/>
             <a:endParaRPr lang="en-US" sz="2400" b="0" cap="none" spc="0" dirty="0">
               <a:ln w="0"/>
               <a:solidFill>
@@ -9323,59 +9339,6 @@
       </p:grpSp>
       <p:pic>
         <p:nvPicPr>
-          <p:cNvPr id="5128" name="Picture 8" descr="Gentse Feesten campagnebeeld 2012"/>
-          <p:cNvPicPr>
-            <a:picLocks noChangeAspect="1" noChangeArrowheads="1"/>
-          </p:cNvPicPr>
-          <p:nvPr/>
-        </p:nvPicPr>
-        <p:blipFill rotWithShape="1">
-          <a:blip r:embed="rId6">
-            <a:extLst>
-              <a:ext uri="{BEBA8EAE-BF5A-486C-A8C5-ECC9F3942E4B}">
-                <a14:imgProps xmlns:a14="http://schemas.microsoft.com/office/drawing/2010/main">
-                  <a14:imgLayer r:embed="rId7">
-                    <a14:imgEffect>
-                      <a14:brightnessContrast bright="20000" contrast="-40000"/>
-                    </a14:imgEffect>
-                  </a14:imgLayer>
-                </a14:imgProps>
-              </a:ext>
-              <a:ext uri="{28A0092B-C50C-407E-A947-70E740481C1C}">
-                <a14:useLocalDpi xmlns:a14="http://schemas.microsoft.com/office/drawing/2010/main" val="0"/>
-              </a:ext>
-            </a:extLst>
-          </a:blip>
-          <a:srcRect l="3647" t="8672" r="2325" b="16857"/>
-          <a:stretch/>
-        </p:blipFill>
-        <p:spPr bwMode="auto">
-          <a:xfrm>
-            <a:off x="3962147" y="4988435"/>
-            <a:ext cx="1532548" cy="1555485"/>
-          </a:xfrm>
-          <a:prstGeom prst="ellipse">
-            <a:avLst/>
-          </a:prstGeom>
-          <a:ln w="38100">
-            <a:solidFill>
-              <a:schemeClr val="accent5"/>
-            </a:solidFill>
-          </a:ln>
-          <a:effectLst/>
-          <a:extLst>
-            <a:ext uri="{909E8E84-426E-40DD-AFC4-6F175D3DCCD1}">
-              <a14:hiddenFill xmlns:a14="http://schemas.microsoft.com/office/drawing/2010/main">
-                <a:solidFill>
-                  <a:srgbClr val="FFFFFF"/>
-                </a:solidFill>
-              </a14:hiddenFill>
-            </a:ext>
-          </a:extLst>
-        </p:spPr>
-      </p:pic>
-      <p:pic>
-        <p:nvPicPr>
           <p:cNvPr id="13" name="Picture 12"/>
           <p:cNvPicPr>
             <a:picLocks noChangeAspect="1"/>
@@ -9383,7 +9346,7 @@
           <p:nvPr/>
         </p:nvPicPr>
         <p:blipFill>
-          <a:blip r:embed="rId8">
+          <a:blip r:embed="rId6">
             <a:extLst>
               <a:ext uri="{28A0092B-C50C-407E-A947-70E740481C1C}">
                 <a14:useLocalDpi xmlns:a14="http://schemas.microsoft.com/office/drawing/2010/main" val="0"/>
@@ -9419,7 +9382,7 @@
           <p:nvPr/>
         </p:nvPicPr>
         <p:blipFill rotWithShape="1">
-          <a:blip r:embed="rId9">
+          <a:blip r:embed="rId7">
             <a:extLst>
               <a:ext uri="{28A0092B-C50C-407E-A947-70E740481C1C}">
                 <a14:useLocalDpi xmlns:a14="http://schemas.microsoft.com/office/drawing/2010/main" val="0"/>
@@ -9433,6 +9396,50 @@
           <a:xfrm>
             <a:off x="6845849" y="4419554"/>
             <a:ext cx="1663826" cy="1610912"/>
+          </a:xfrm>
+          <a:prstGeom prst="ellipse">
+            <a:avLst/>
+          </a:prstGeom>
+          <a:ln w="38100">
+            <a:solidFill>
+              <a:schemeClr val="accent5"/>
+            </a:solidFill>
+          </a:ln>
+          <a:effectLst/>
+          <a:extLst>
+            <a:ext uri="{909E8E84-426E-40DD-AFC4-6F175D3DCCD1}">
+              <a14:hiddenFill xmlns:a14="http://schemas.microsoft.com/office/drawing/2010/main">
+                <a:solidFill>
+                  <a:srgbClr val="FFFFFF"/>
+                </a:solidFill>
+              </a14:hiddenFill>
+            </a:ext>
+          </a:extLst>
+        </p:spPr>
+      </p:pic>
+      <p:pic>
+        <p:nvPicPr>
+          <p:cNvPr id="1026" name="Picture 2" descr="http://appsforghent.be/wp-content/themes/vibrant/images/logo.png"/>
+          <p:cNvPicPr>
+            <a:picLocks noChangeAspect="1" noChangeArrowheads="1"/>
+          </p:cNvPicPr>
+          <p:nvPr/>
+        </p:nvPicPr>
+        <p:blipFill rotWithShape="1">
+          <a:blip r:embed="rId8">
+            <a:extLst>
+              <a:ext uri="{28A0092B-C50C-407E-A947-70E740481C1C}">
+                <a14:useLocalDpi xmlns:a14="http://schemas.microsoft.com/office/drawing/2010/main" val="0"/>
+              </a:ext>
+            </a:extLst>
+          </a:blip>
+          <a:srcRect t="-2425" r="47278"/>
+          <a:stretch/>
+        </p:blipFill>
+        <p:spPr bwMode="auto">
+          <a:xfrm>
+            <a:off x="3892620" y="4988435"/>
+            <a:ext cx="1588830" cy="1470520"/>
           </a:xfrm>
           <a:prstGeom prst="ellipse">
             <a:avLst/>
@@ -9678,7 +9685,7 @@
                                           </p:stCondLst>
                                         </p:cTn>
                                         <p:tgtEl>
-                                          <p:spTgt spid="5128"/>
+                                          <p:spTgt spid="13"/>
                                         </p:tgtEl>
                                         <p:attrNameLst>
                                           <p:attrName>style.visibility</p:attrName>
@@ -9710,7 +9717,7 @@
                                       <p:cBhvr>
                                         <p:cTn id="26" dur="80" tmFilter="0, 0; .2, .5; .8, .5; 1, 0"/>
                                         <p:tgtEl>
-                                          <p:spTgt spid="5128"/>
+                                          <p:spTgt spid="13"/>
                                         </p:tgtEl>
                                       </p:cBhvr>
                                     </p:animEffect>
@@ -9718,7 +9725,7 @@
                                       <p:cBhvr>
                                         <p:cTn id="27" dur="40" autoRev="1" fill="hold"/>
                                         <p:tgtEl>
-                                          <p:spTgt spid="5128"/>
+                                          <p:spTgt spid="13"/>
                                         </p:tgtEl>
                                       </p:cBhvr>
                                       <p:by x="105000" y="105000"/>
@@ -9749,7 +9756,7 @@
                                           </p:stCondLst>
                                         </p:cTn>
                                         <p:tgtEl>
-                                          <p:spTgt spid="13"/>
+                                          <p:spTgt spid="18"/>
                                         </p:tgtEl>
                                         <p:attrNameLst>
                                           <p:attrName>style.visibility</p:attrName>
@@ -9781,7 +9788,7 @@
                                       <p:cBhvr>
                                         <p:cTn id="33" dur="80" tmFilter="0, 0; .2, .5; .8, .5; 1, 0"/>
                                         <p:tgtEl>
-                                          <p:spTgt spid="13"/>
+                                          <p:spTgt spid="18"/>
                                         </p:tgtEl>
                                       </p:cBhvr>
                                     </p:animEffect>
@@ -9789,7 +9796,7 @@
                                       <p:cBhvr>
                                         <p:cTn id="34" dur="40" autoRev="1" fill="hold"/>
                                         <p:tgtEl>
-                                          <p:spTgt spid="13"/>
+                                          <p:spTgt spid="18"/>
                                         </p:tgtEl>
                                       </p:cBhvr>
                                       <p:by x="105000" y="105000"/>
@@ -9820,7 +9827,7 @@
                                           </p:stCondLst>
                                         </p:cTn>
                                         <p:tgtEl>
-                                          <p:spTgt spid="18"/>
+                                          <p:spTgt spid="5130"/>
                                         </p:tgtEl>
                                         <p:attrNameLst>
                                           <p:attrName>style.visibility</p:attrName>
@@ -9852,84 +9859,13 @@
                                       <p:cBhvr>
                                         <p:cTn id="40" dur="80" tmFilter="0, 0; .2, .5; .8, .5; 1, 0"/>
                                         <p:tgtEl>
-                                          <p:spTgt spid="18"/>
+                                          <p:spTgt spid="5130"/>
                                         </p:tgtEl>
                                       </p:cBhvr>
                                     </p:animEffect>
                                     <p:animScale>
                                       <p:cBhvr>
                                         <p:cTn id="41" dur="40" autoRev="1" fill="hold"/>
-                                        <p:tgtEl>
-                                          <p:spTgt spid="18"/>
-                                        </p:tgtEl>
-                                      </p:cBhvr>
-                                      <p:by x="105000" y="105000"/>
-                                    </p:animScale>
-                                  </p:childTnLst>
-                                </p:cTn>
-                              </p:par>
-                            </p:childTnLst>
-                          </p:cTn>
-                        </p:par>
-                        <p:par>
-                          <p:cTn id="42" fill="hold">
-                            <p:stCondLst>
-                              <p:cond delay="1100"/>
-                            </p:stCondLst>
-                            <p:childTnLst>
-                              <p:par>
-                                <p:cTn id="43" presetID="1" presetClass="entr" presetSubtype="0" fill="hold" nodeType="afterEffect">
-                                  <p:stCondLst>
-                                    <p:cond delay="0"/>
-                                  </p:stCondLst>
-                                  <p:childTnLst>
-                                    <p:set>
-                                      <p:cBhvr>
-                                        <p:cTn id="44" dur="1" fill="hold">
-                                          <p:stCondLst>
-                                            <p:cond delay="79"/>
-                                          </p:stCondLst>
-                                        </p:cTn>
-                                        <p:tgtEl>
-                                          <p:spTgt spid="5130"/>
-                                        </p:tgtEl>
-                                        <p:attrNameLst>
-                                          <p:attrName>style.visibility</p:attrName>
-                                        </p:attrNameLst>
-                                      </p:cBhvr>
-                                      <p:to>
-                                        <p:strVal val="visible"/>
-                                      </p:to>
-                                    </p:set>
-                                  </p:childTnLst>
-                                </p:cTn>
-                              </p:par>
-                            </p:childTnLst>
-                          </p:cTn>
-                        </p:par>
-                        <p:par>
-                          <p:cTn id="45" fill="hold">
-                            <p:stCondLst>
-                              <p:cond delay="1180"/>
-                            </p:stCondLst>
-                            <p:childTnLst>
-                              <p:par>
-                                <p:cTn id="46" presetID="26" presetClass="emph" presetSubtype="0" fill="hold" nodeType="afterEffect">
-                                  <p:stCondLst>
-                                    <p:cond delay="0"/>
-                                  </p:stCondLst>
-                                  <p:childTnLst>
-                                    <p:animEffect transition="out" filter="fade">
-                                      <p:cBhvr>
-                                        <p:cTn id="47" dur="80" tmFilter="0, 0; .2, .5; .8, .5; 1, 0"/>
-                                        <p:tgtEl>
-                                          <p:spTgt spid="5130"/>
-                                        </p:tgtEl>
-                                      </p:cBhvr>
-                                    </p:animEffect>
-                                    <p:animScale>
-                                      <p:cBhvr>
-                                        <p:cTn id="48" dur="40" autoRev="1" fill="hold"/>
                                         <p:tgtEl>
                                           <p:spTgt spid="5130"/>
                                         </p:tgtEl>
@@ -10127,7 +10063,7 @@
         </p:nvGrpSpPr>
         <p:grpSpPr>
           <a:xfrm>
-            <a:off x="2483768" y="4609648"/>
+            <a:off x="5076056" y="3856373"/>
             <a:ext cx="2395193" cy="1862199"/>
             <a:chOff x="2915816" y="3913485"/>
             <a:chExt cx="2395193" cy="1862199"/>
@@ -11002,7 +10938,7 @@
             <a:pPr algn="l"/>
             <a:r>
               <a:rPr lang="nl-BE" dirty="0" smtClean="0"/>
-              <a:t>RDFa</a:t>
+              <a:t>Semantic Web</a:t>
             </a:r>
             <a:endParaRPr lang="nl-BE" dirty="0"/>
           </a:p>
@@ -11085,7 +11021,7 @@
         </p:blipFill>
         <p:spPr>
           <a:xfrm rot="549465">
-            <a:off x="705085" y="2601887"/>
+            <a:off x="-220675" y="2601887"/>
             <a:ext cx="8915400" cy="3829050"/>
           </a:xfrm>
           <a:prstGeom prst="rect">
@@ -11127,206 +11063,6 @@
           </a:effectLst>
         </p:spPr>
       </p:pic>
-      <p:sp>
-        <p:nvSpPr>
-          <p:cNvPr id="12" name="Content Placeholder 2"/>
-          <p:cNvSpPr txBox="1">
-            <a:spLocks/>
-          </p:cNvSpPr>
-          <p:nvPr/>
-        </p:nvSpPr>
-        <p:spPr>
-          <a:xfrm>
-            <a:off x="497179" y="5313656"/>
-            <a:ext cx="8229600" cy="4525963"/>
-          </a:xfrm>
-          <a:prstGeom prst="rect">
-            <a:avLst/>
-          </a:prstGeom>
-        </p:spPr>
-        <p:txBody>
-          <a:bodyPr vert="horz" lIns="91440" tIns="45720" rIns="91440" bIns="45720" rtlCol="0">
-            <a:normAutofit/>
-          </a:bodyPr>
-          <a:lstStyle>
-            <a:lvl1pPr marL="342900" indent="-342900" algn="l" defTabSz="914400" rtl="0" eaLnBrk="1" latinLnBrk="0" hangingPunct="1">
-              <a:spcBef>
-                <a:spcPct val="20000"/>
-              </a:spcBef>
-              <a:buFont typeface="Arial" pitchFamily="34" charset="0"/>
-              <a:buChar char="•"/>
-              <a:defRPr sz="2400" kern="1200">
-                <a:solidFill>
-                  <a:schemeClr val="tx1">
-                    <a:lumMod val="50000"/>
-                    <a:lumOff val="50000"/>
-                  </a:schemeClr>
-                </a:solidFill>
-                <a:latin typeface="+mj-lt"/>
-                <a:ea typeface="+mn-ea"/>
-                <a:cs typeface="+mn-cs"/>
-              </a:defRPr>
-            </a:lvl1pPr>
-            <a:lvl2pPr marL="742950" indent="-285750" algn="l" defTabSz="914400" rtl="0" eaLnBrk="1" latinLnBrk="0" hangingPunct="1">
-              <a:spcBef>
-                <a:spcPct val="20000"/>
-              </a:spcBef>
-              <a:buFont typeface="Courier New" pitchFamily="49" charset="0"/>
-              <a:buChar char="o"/>
-              <a:defRPr sz="1600" kern="1200">
-                <a:solidFill>
-                  <a:schemeClr val="tx1">
-                    <a:lumMod val="50000"/>
-                    <a:lumOff val="50000"/>
-                  </a:schemeClr>
-                </a:solidFill>
-                <a:latin typeface="+mj-lt"/>
-                <a:ea typeface="+mn-ea"/>
-                <a:cs typeface="+mn-cs"/>
-              </a:defRPr>
-            </a:lvl2pPr>
-            <a:lvl3pPr marL="1143000" indent="-228600" algn="l" defTabSz="914400" rtl="0" eaLnBrk="1" latinLnBrk="0" hangingPunct="1">
-              <a:spcBef>
-                <a:spcPct val="20000"/>
-              </a:spcBef>
-              <a:buFont typeface="Arial" pitchFamily="34" charset="0"/>
-              <a:buChar char="•"/>
-              <a:defRPr sz="1600" kern="1200">
-                <a:solidFill>
-                  <a:schemeClr val="tx1">
-                    <a:lumMod val="50000"/>
-                    <a:lumOff val="50000"/>
-                  </a:schemeClr>
-                </a:solidFill>
-                <a:latin typeface="+mj-lt"/>
-                <a:ea typeface="+mn-ea"/>
-                <a:cs typeface="+mn-cs"/>
-              </a:defRPr>
-            </a:lvl3pPr>
-            <a:lvl4pPr marL="1600200" indent="-228600" algn="l" defTabSz="914400" rtl="0" eaLnBrk="1" latinLnBrk="0" hangingPunct="1">
-              <a:spcBef>
-                <a:spcPct val="20000"/>
-              </a:spcBef>
-              <a:buFont typeface="Courier New" pitchFamily="49" charset="0"/>
-              <a:buChar char="o"/>
-              <a:defRPr sz="1600" kern="1200">
-                <a:solidFill>
-                  <a:schemeClr val="tx1">
-                    <a:lumMod val="50000"/>
-                    <a:lumOff val="50000"/>
-                  </a:schemeClr>
-                </a:solidFill>
-                <a:latin typeface="+mj-lt"/>
-                <a:ea typeface="+mn-ea"/>
-                <a:cs typeface="+mn-cs"/>
-              </a:defRPr>
-            </a:lvl4pPr>
-            <a:lvl5pPr marL="2057400" indent="-228600" algn="l" defTabSz="914400" rtl="0" eaLnBrk="1" latinLnBrk="0" hangingPunct="1">
-              <a:spcBef>
-                <a:spcPct val="20000"/>
-              </a:spcBef>
-              <a:buFont typeface="Arial" pitchFamily="34" charset="0"/>
-              <a:buChar char="•"/>
-              <a:defRPr sz="1600" kern="1200">
-                <a:solidFill>
-                  <a:schemeClr val="tx1">
-                    <a:lumMod val="50000"/>
-                    <a:lumOff val="50000"/>
-                  </a:schemeClr>
-                </a:solidFill>
-                <a:latin typeface="+mj-lt"/>
-                <a:ea typeface="+mn-ea"/>
-                <a:cs typeface="+mn-cs"/>
-              </a:defRPr>
-            </a:lvl5pPr>
-            <a:lvl6pPr marL="2514600" indent="-228600" algn="l" defTabSz="914400" rtl="0" eaLnBrk="1" latinLnBrk="0" hangingPunct="1">
-              <a:spcBef>
-                <a:spcPct val="20000"/>
-              </a:spcBef>
-              <a:buFont typeface="Courier New" pitchFamily="49" charset="0"/>
-              <a:buChar char="o"/>
-              <a:defRPr sz="1600" kern="1200">
-                <a:solidFill>
-                  <a:schemeClr val="tx1">
-                    <a:lumMod val="50000"/>
-                    <a:lumOff val="50000"/>
-                  </a:schemeClr>
-                </a:solidFill>
-                <a:latin typeface="+mj-lt"/>
-                <a:ea typeface="+mn-ea"/>
-                <a:cs typeface="+mn-cs"/>
-              </a:defRPr>
-            </a:lvl6pPr>
-            <a:lvl7pPr marL="2971800" indent="-228600" algn="l" defTabSz="914400" rtl="0" eaLnBrk="1" latinLnBrk="0" hangingPunct="1">
-              <a:spcBef>
-                <a:spcPct val="20000"/>
-              </a:spcBef>
-              <a:buFont typeface="Arial" pitchFamily="34" charset="0"/>
-              <a:buChar char="•"/>
-              <a:defRPr sz="1600" kern="1200">
-                <a:solidFill>
-                  <a:schemeClr val="tx1">
-                    <a:lumMod val="50000"/>
-                    <a:lumOff val="50000"/>
-                  </a:schemeClr>
-                </a:solidFill>
-                <a:latin typeface="+mj-lt"/>
-                <a:ea typeface="+mn-ea"/>
-                <a:cs typeface="+mn-cs"/>
-              </a:defRPr>
-            </a:lvl7pPr>
-            <a:lvl8pPr marL="3429000" indent="-228600" algn="l" defTabSz="914400" rtl="0" eaLnBrk="1" latinLnBrk="0" hangingPunct="1">
-              <a:spcBef>
-                <a:spcPct val="20000"/>
-              </a:spcBef>
-              <a:buFont typeface="Courier New" pitchFamily="49" charset="0"/>
-              <a:buChar char="o"/>
-              <a:defRPr sz="1600" kern="1200">
-                <a:solidFill>
-                  <a:schemeClr val="tx1">
-                    <a:lumMod val="50000"/>
-                    <a:lumOff val="50000"/>
-                  </a:schemeClr>
-                </a:solidFill>
-                <a:latin typeface="+mj-lt"/>
-                <a:ea typeface="+mn-ea"/>
-                <a:cs typeface="+mn-cs"/>
-              </a:defRPr>
-            </a:lvl8pPr>
-            <a:lvl9pPr marL="3886200" indent="-228600" algn="l" defTabSz="914400" rtl="0" eaLnBrk="1" latinLnBrk="0" hangingPunct="1">
-              <a:spcBef>
-                <a:spcPct val="20000"/>
-              </a:spcBef>
-              <a:buFont typeface="Arial" pitchFamily="34" charset="0"/>
-              <a:buChar char="•"/>
-              <a:defRPr sz="1600" kern="1200">
-                <a:solidFill>
-                  <a:schemeClr val="tx1">
-                    <a:lumMod val="50000"/>
-                    <a:lumOff val="50000"/>
-                  </a:schemeClr>
-                </a:solidFill>
-                <a:latin typeface="+mj-lt"/>
-                <a:ea typeface="+mn-ea"/>
-                <a:cs typeface="+mn-cs"/>
-              </a:defRPr>
-            </a:lvl9pPr>
-          </a:lstStyle>
-          <a:p>
-            <a:r>
-              <a:rPr lang="nl-BE" dirty="0" smtClean="0"/>
-              <a:t>Semantic Web</a:t>
-            </a:r>
-          </a:p>
-          <a:p>
-            <a:r>
-              <a:rPr lang="nl-BE" dirty="0" smtClean="0"/>
-              <a:t>Vocabularies</a:t>
-            </a:r>
-            <a:endParaRPr lang="nl-BE" dirty="0"/>
-          </a:p>
-        </p:txBody>
-      </p:sp>
     </p:spTree>
     <p:extLst>
       <p:ext uri="{BB962C8B-B14F-4D97-AF65-F5344CB8AC3E}">

</xml_diff>